<commit_message>
Removed unused attribute bubble
</commit_message>
<xml_diff>
--- a/ERModel_Group5.pptx
+++ b/ERModel_Group5.pptx
@@ -106,7 +106,7 @@
   </p:defaultTextStyle>
   <p:extLst>
     <p:ext uri="{EFAFB233-063F-42B5-8137-9DF3F51BA10A}">
-      <p15:sldGuideLst xmlns:p15="http://schemas.microsoft.com/office/powerpoint/2012/main">
+      <p15:sldGuideLst xmlns:p15="http://schemas.microsoft.com/office/powerpoint/2012/main" xmlns="">
         <p15:guide id="1" orient="horz" pos="2160">
           <p15:clr>
             <a:srgbClr val="A4A3A4"/>
@@ -302,7 +302,8 @@
           <a:p>
             <a:fld id="{DD835B76-D165-4C47-BDCE-CF989D3641B7}" type="datetimeFigureOut">
               <a:rPr lang="en-US" smtClean="0"/>
-              <a:t>3/7/17</a:t>
+              <a:pPr/>
+              <a:t>3/8/2017</a:t>
             </a:fld>
             <a:endParaRPr lang="en-US"/>
           </a:p>
@@ -344,6 +345,7 @@
           <a:p>
             <a:fld id="{B9AB9693-168F-4BC6-BAF9-F2F7C62D3B66}" type="slidenum">
               <a:rPr lang="en-US" smtClean="0"/>
+              <a:pPr/>
               <a:t>‹#›</a:t>
             </a:fld>
             <a:endParaRPr lang="en-US"/>
@@ -465,7 +467,8 @@
           <a:p>
             <a:fld id="{DD835B76-D165-4C47-BDCE-CF989D3641B7}" type="datetimeFigureOut">
               <a:rPr lang="en-US" smtClean="0"/>
-              <a:t>3/7/17</a:t>
+              <a:pPr/>
+              <a:t>3/8/2017</a:t>
             </a:fld>
             <a:endParaRPr lang="en-US"/>
           </a:p>
@@ -507,6 +510,7 @@
           <a:p>
             <a:fld id="{B9AB9693-168F-4BC6-BAF9-F2F7C62D3B66}" type="slidenum">
               <a:rPr lang="en-US" smtClean="0"/>
+              <a:pPr/>
               <a:t>‹#›</a:t>
             </a:fld>
             <a:endParaRPr lang="en-US"/>
@@ -638,7 +642,8 @@
           <a:p>
             <a:fld id="{DD835B76-D165-4C47-BDCE-CF989D3641B7}" type="datetimeFigureOut">
               <a:rPr lang="en-US" smtClean="0"/>
-              <a:t>3/7/17</a:t>
+              <a:pPr/>
+              <a:t>3/8/2017</a:t>
             </a:fld>
             <a:endParaRPr lang="en-US"/>
           </a:p>
@@ -680,6 +685,7 @@
           <a:p>
             <a:fld id="{B9AB9693-168F-4BC6-BAF9-F2F7C62D3B66}" type="slidenum">
               <a:rPr lang="en-US" smtClean="0"/>
+              <a:pPr/>
               <a:t>‹#›</a:t>
             </a:fld>
             <a:endParaRPr lang="en-US"/>
@@ -801,7 +807,8 @@
           <a:p>
             <a:fld id="{DD835B76-D165-4C47-BDCE-CF989D3641B7}" type="datetimeFigureOut">
               <a:rPr lang="en-US" smtClean="0"/>
-              <a:t>3/7/17</a:t>
+              <a:pPr/>
+              <a:t>3/8/2017</a:t>
             </a:fld>
             <a:endParaRPr lang="en-US"/>
           </a:p>
@@ -843,6 +850,7 @@
           <a:p>
             <a:fld id="{B9AB9693-168F-4BC6-BAF9-F2F7C62D3B66}" type="slidenum">
               <a:rPr lang="en-US" smtClean="0"/>
+              <a:pPr/>
               <a:t>‹#›</a:t>
             </a:fld>
             <a:endParaRPr lang="en-US"/>
@@ -1041,7 +1049,8 @@
           <a:p>
             <a:fld id="{DD835B76-D165-4C47-BDCE-CF989D3641B7}" type="datetimeFigureOut">
               <a:rPr lang="en-US" smtClean="0"/>
-              <a:t>3/7/17</a:t>
+              <a:pPr/>
+              <a:t>3/8/2017</a:t>
             </a:fld>
             <a:endParaRPr lang="en-US"/>
           </a:p>
@@ -1083,6 +1092,7 @@
           <a:p>
             <a:fld id="{B9AB9693-168F-4BC6-BAF9-F2F7C62D3B66}" type="slidenum">
               <a:rPr lang="en-US" smtClean="0"/>
+              <a:pPr/>
               <a:t>‹#›</a:t>
             </a:fld>
             <a:endParaRPr lang="en-US"/>
@@ -1321,7 +1331,8 @@
           <a:p>
             <a:fld id="{DD835B76-D165-4C47-BDCE-CF989D3641B7}" type="datetimeFigureOut">
               <a:rPr lang="en-US" smtClean="0"/>
-              <a:t>3/7/17</a:t>
+              <a:pPr/>
+              <a:t>3/8/2017</a:t>
             </a:fld>
             <a:endParaRPr lang="en-US"/>
           </a:p>
@@ -1363,6 +1374,7 @@
           <a:p>
             <a:fld id="{B9AB9693-168F-4BC6-BAF9-F2F7C62D3B66}" type="slidenum">
               <a:rPr lang="en-US" smtClean="0"/>
+              <a:pPr/>
               <a:t>‹#›</a:t>
             </a:fld>
             <a:endParaRPr lang="en-US"/>
@@ -1735,7 +1747,8 @@
           <a:p>
             <a:fld id="{DD835B76-D165-4C47-BDCE-CF989D3641B7}" type="datetimeFigureOut">
               <a:rPr lang="en-US" smtClean="0"/>
-              <a:t>3/7/17</a:t>
+              <a:pPr/>
+              <a:t>3/8/2017</a:t>
             </a:fld>
             <a:endParaRPr lang="en-US"/>
           </a:p>
@@ -1777,6 +1790,7 @@
           <a:p>
             <a:fld id="{B9AB9693-168F-4BC6-BAF9-F2F7C62D3B66}" type="slidenum">
               <a:rPr lang="en-US" smtClean="0"/>
+              <a:pPr/>
               <a:t>‹#›</a:t>
             </a:fld>
             <a:endParaRPr lang="en-US"/>
@@ -1847,7 +1861,8 @@
           <a:p>
             <a:fld id="{DD835B76-D165-4C47-BDCE-CF989D3641B7}" type="datetimeFigureOut">
               <a:rPr lang="en-US" smtClean="0"/>
-              <a:t>3/7/17</a:t>
+              <a:pPr/>
+              <a:t>3/8/2017</a:t>
             </a:fld>
             <a:endParaRPr lang="en-US"/>
           </a:p>
@@ -1889,6 +1904,7 @@
           <a:p>
             <a:fld id="{B9AB9693-168F-4BC6-BAF9-F2F7C62D3B66}" type="slidenum">
               <a:rPr lang="en-US" smtClean="0"/>
+              <a:pPr/>
               <a:t>‹#›</a:t>
             </a:fld>
             <a:endParaRPr lang="en-US"/>
@@ -1937,7 +1953,8 @@
           <a:p>
             <a:fld id="{DD835B76-D165-4C47-BDCE-CF989D3641B7}" type="datetimeFigureOut">
               <a:rPr lang="en-US" smtClean="0"/>
-              <a:t>3/7/17</a:t>
+              <a:pPr/>
+              <a:t>3/8/2017</a:t>
             </a:fld>
             <a:endParaRPr lang="en-US"/>
           </a:p>
@@ -1979,6 +1996,7 @@
           <a:p>
             <a:fld id="{B9AB9693-168F-4BC6-BAF9-F2F7C62D3B66}" type="slidenum">
               <a:rPr lang="en-US" smtClean="0"/>
+              <a:pPr/>
               <a:t>‹#›</a:t>
             </a:fld>
             <a:endParaRPr lang="en-US"/>
@@ -2207,7 +2225,8 @@
           <a:p>
             <a:fld id="{DD835B76-D165-4C47-BDCE-CF989D3641B7}" type="datetimeFigureOut">
               <a:rPr lang="en-US" smtClean="0"/>
-              <a:t>3/7/17</a:t>
+              <a:pPr/>
+              <a:t>3/8/2017</a:t>
             </a:fld>
             <a:endParaRPr lang="en-US"/>
           </a:p>
@@ -2249,6 +2268,7 @@
           <a:p>
             <a:fld id="{B9AB9693-168F-4BC6-BAF9-F2F7C62D3B66}" type="slidenum">
               <a:rPr lang="en-US" smtClean="0"/>
+              <a:pPr/>
               <a:t>‹#›</a:t>
             </a:fld>
             <a:endParaRPr lang="en-US"/>
@@ -2454,7 +2474,8 @@
           <a:p>
             <a:fld id="{DD835B76-D165-4C47-BDCE-CF989D3641B7}" type="datetimeFigureOut">
               <a:rPr lang="en-US" smtClean="0"/>
-              <a:t>3/7/17</a:t>
+              <a:pPr/>
+              <a:t>3/8/2017</a:t>
             </a:fld>
             <a:endParaRPr lang="en-US"/>
           </a:p>
@@ -2496,6 +2517,7 @@
           <a:p>
             <a:fld id="{B9AB9693-168F-4BC6-BAF9-F2F7C62D3B66}" type="slidenum">
               <a:rPr lang="en-US" smtClean="0"/>
+              <a:pPr/>
               <a:t>‹#›</a:t>
             </a:fld>
             <a:endParaRPr lang="en-US"/>
@@ -2660,7 +2682,8 @@
           <a:p>
             <a:fld id="{DD835B76-D165-4C47-BDCE-CF989D3641B7}" type="datetimeFigureOut">
               <a:rPr lang="en-US" smtClean="0"/>
-              <a:t>3/7/17</a:t>
+              <a:pPr/>
+              <a:t>3/8/2017</a:t>
             </a:fld>
             <a:endParaRPr lang="en-US"/>
           </a:p>
@@ -2738,6 +2761,7 @@
           <a:p>
             <a:fld id="{B9AB9693-168F-4BC6-BAF9-F2F7C62D3B66}" type="slidenum">
               <a:rPr lang="en-US" smtClean="0"/>
+              <a:pPr/>
               <a:t>‹#›</a:t>
             </a:fld>
             <a:endParaRPr lang="en-US"/>
@@ -6158,50 +6182,6 @@
           </a:p>
         </p:txBody>
       </p:sp>
-      <p:sp>
-        <p:nvSpPr>
-          <p:cNvPr id="167" name="Oval 166"/>
-          <p:cNvSpPr/>
-          <p:nvPr/>
-        </p:nvSpPr>
-        <p:spPr>
-          <a:xfrm>
-            <a:off x="2596479" y="4386794"/>
-            <a:ext cx="967603" cy="239999"/>
-          </a:xfrm>
-          <a:prstGeom prst="ellipse">
-            <a:avLst/>
-          </a:prstGeom>
-          <a:noFill/>
-          <a:ln w="12700">
-            <a:solidFill>
-              <a:schemeClr val="tx1"/>
-            </a:solidFill>
-          </a:ln>
-        </p:spPr>
-        <p:style>
-          <a:lnRef idx="2">
-            <a:schemeClr val="accent6"/>
-          </a:lnRef>
-          <a:fillRef idx="1">
-            <a:schemeClr val="lt1"/>
-          </a:fillRef>
-          <a:effectRef idx="0">
-            <a:schemeClr val="accent6"/>
-          </a:effectRef>
-          <a:fontRef idx="minor">
-            <a:schemeClr val="dk1"/>
-          </a:fontRef>
-        </p:style>
-        <p:txBody>
-          <a:bodyPr rtlCol="0" anchor="ctr"/>
-          <a:lstStyle/>
-          <a:p>
-            <a:pPr algn="ctr"/>
-            <a:endParaRPr lang="en-US"/>
-          </a:p>
-        </p:txBody>
-      </p:sp>
       <p:cxnSp>
         <p:nvCxnSpPr>
           <p:cNvPr id="169" name="Straight Connector 168"/>
@@ -8113,72 +8093,6 @@
             <a:solidFill>
               <a:schemeClr val="tx1"/>
             </a:solidFill>
-          </a:ln>
-        </p:spPr>
-        <p:style>
-          <a:lnRef idx="1">
-            <a:schemeClr val="accent1"/>
-          </a:lnRef>
-          <a:fillRef idx="0">
-            <a:schemeClr val="accent1"/>
-          </a:fillRef>
-          <a:effectRef idx="0">
-            <a:schemeClr val="accent1"/>
-          </a:effectRef>
-          <a:fontRef idx="minor">
-            <a:schemeClr val="tx1"/>
-          </a:fontRef>
-        </p:style>
-      </p:cxnSp>
-      <p:sp>
-        <p:nvSpPr>
-          <p:cNvPr id="330" name="TextBox 329"/>
-          <p:cNvSpPr txBox="1"/>
-          <p:nvPr/>
-        </p:nvSpPr>
-        <p:spPr>
-          <a:xfrm>
-            <a:off x="6729342" y="6151914"/>
-            <a:ext cx="2058034" cy="307777"/>
-          </a:xfrm>
-          <a:prstGeom prst="rect">
-            <a:avLst/>
-          </a:prstGeom>
-          <a:noFill/>
-        </p:spPr>
-        <p:txBody>
-          <a:bodyPr wrap="square" rtlCol="0">
-            <a:spAutoFit/>
-          </a:bodyPr>
-          <a:lstStyle/>
-          <a:p>
-            <a:r>
-              <a:rPr lang="en-US" sz="1400" u="sng" dirty="0" smtClean="0"/>
-              <a:t>Denotes Rounded Arrow</a:t>
-            </a:r>
-            <a:endParaRPr lang="en-US" sz="1400" u="sng" dirty="0"/>
-          </a:p>
-        </p:txBody>
-      </p:sp>
-      <p:cxnSp>
-        <p:nvCxnSpPr>
-          <p:cNvPr id="331" name="Straight Arrow Connector 330"/>
-          <p:cNvCxnSpPr/>
-          <p:nvPr/>
-        </p:nvCxnSpPr>
-        <p:spPr>
-          <a:xfrm flipH="1">
-            <a:off x="7162587" y="6630949"/>
-            <a:ext cx="1243472" cy="0"/>
-          </a:xfrm>
-          <a:prstGeom prst="straightConnector1">
-            <a:avLst/>
-          </a:prstGeom>
-          <a:ln>
-            <a:solidFill>
-              <a:schemeClr val="tx1"/>
-            </a:solidFill>
-            <a:tailEnd type="arrow"/>
           </a:ln>
         </p:spPr>
         <p:style>

</xml_diff>

<commit_message>
Updated ER Model with SQL attributes
</commit_message>
<xml_diff>
--- a/ERModel_Group5.pptx
+++ b/ERModel_Group5.pptx
@@ -106,7 +106,7 @@
   </p:defaultTextStyle>
   <p:extLst>
     <p:ext uri="{EFAFB233-063F-42B5-8137-9DF3F51BA10A}">
-      <p15:sldGuideLst xmlns:p15="http://schemas.microsoft.com/office/powerpoint/2012/main" xmlns="">
+      <p15:sldGuideLst xmlns:p15="http://schemas.microsoft.com/office/powerpoint/2012/main">
         <p15:guide id="1" orient="horz" pos="2160">
           <p15:clr>
             <a:srgbClr val="A4A3A4"/>
@@ -121,6 +121,10 @@
     </p:ext>
   </p:extLst>
 </p:presentation>
+</file>
+
+<file path=ppt/revisionInfo.xml><?xml version="1.0" encoding="utf-8"?>
+<p1510:revInfo xmlns:a="http://schemas.openxmlformats.org/drawingml/2006/main" xmlns:r="http://schemas.openxmlformats.org/officeDocument/2006/relationships" xmlns:p1510="http://schemas.microsoft.com/office/powerpoint/2015/10/main"/>
 </file>
 
 <file path=ppt/slideLayouts/slideLayout1.xml><?xml version="1.0" encoding="utf-8"?>
@@ -303,7 +307,7 @@
             <a:fld id="{DD835B76-D165-4C47-BDCE-CF989D3641B7}" type="datetimeFigureOut">
               <a:rPr lang="en-US" smtClean="0"/>
               <a:pPr/>
-              <a:t>3/8/2017</a:t>
+              <a:t>5/3/2017</a:t>
             </a:fld>
             <a:endParaRPr lang="en-US"/>
           </a:p>
@@ -468,7 +472,7 @@
             <a:fld id="{DD835B76-D165-4C47-BDCE-CF989D3641B7}" type="datetimeFigureOut">
               <a:rPr lang="en-US" smtClean="0"/>
               <a:pPr/>
-              <a:t>3/8/2017</a:t>
+              <a:t>5/3/2017</a:t>
             </a:fld>
             <a:endParaRPr lang="en-US"/>
           </a:p>
@@ -643,7 +647,7 @@
             <a:fld id="{DD835B76-D165-4C47-BDCE-CF989D3641B7}" type="datetimeFigureOut">
               <a:rPr lang="en-US" smtClean="0"/>
               <a:pPr/>
-              <a:t>3/8/2017</a:t>
+              <a:t>5/3/2017</a:t>
             </a:fld>
             <a:endParaRPr lang="en-US"/>
           </a:p>
@@ -808,7 +812,7 @@
             <a:fld id="{DD835B76-D165-4C47-BDCE-CF989D3641B7}" type="datetimeFigureOut">
               <a:rPr lang="en-US" smtClean="0"/>
               <a:pPr/>
-              <a:t>3/8/2017</a:t>
+              <a:t>5/3/2017</a:t>
             </a:fld>
             <a:endParaRPr lang="en-US"/>
           </a:p>
@@ -1050,7 +1054,7 @@
             <a:fld id="{DD835B76-D165-4C47-BDCE-CF989D3641B7}" type="datetimeFigureOut">
               <a:rPr lang="en-US" smtClean="0"/>
               <a:pPr/>
-              <a:t>3/8/2017</a:t>
+              <a:t>5/3/2017</a:t>
             </a:fld>
             <a:endParaRPr lang="en-US"/>
           </a:p>
@@ -1332,7 +1336,7 @@
             <a:fld id="{DD835B76-D165-4C47-BDCE-CF989D3641B7}" type="datetimeFigureOut">
               <a:rPr lang="en-US" smtClean="0"/>
               <a:pPr/>
-              <a:t>3/8/2017</a:t>
+              <a:t>5/3/2017</a:t>
             </a:fld>
             <a:endParaRPr lang="en-US"/>
           </a:p>
@@ -1748,7 +1752,7 @@
             <a:fld id="{DD835B76-D165-4C47-BDCE-CF989D3641B7}" type="datetimeFigureOut">
               <a:rPr lang="en-US" smtClean="0"/>
               <a:pPr/>
-              <a:t>3/8/2017</a:t>
+              <a:t>5/3/2017</a:t>
             </a:fld>
             <a:endParaRPr lang="en-US"/>
           </a:p>
@@ -1862,7 +1866,7 @@
             <a:fld id="{DD835B76-D165-4C47-BDCE-CF989D3641B7}" type="datetimeFigureOut">
               <a:rPr lang="en-US" smtClean="0"/>
               <a:pPr/>
-              <a:t>3/8/2017</a:t>
+              <a:t>5/3/2017</a:t>
             </a:fld>
             <a:endParaRPr lang="en-US"/>
           </a:p>
@@ -1954,7 +1958,7 @@
             <a:fld id="{DD835B76-D165-4C47-BDCE-CF989D3641B7}" type="datetimeFigureOut">
               <a:rPr lang="en-US" smtClean="0"/>
               <a:pPr/>
-              <a:t>3/8/2017</a:t>
+              <a:t>5/3/2017</a:t>
             </a:fld>
             <a:endParaRPr lang="en-US"/>
           </a:p>
@@ -2226,7 +2230,7 @@
             <a:fld id="{DD835B76-D165-4C47-BDCE-CF989D3641B7}" type="datetimeFigureOut">
               <a:rPr lang="en-US" smtClean="0"/>
               <a:pPr/>
-              <a:t>3/8/2017</a:t>
+              <a:t>5/3/2017</a:t>
             </a:fld>
             <a:endParaRPr lang="en-US"/>
           </a:p>
@@ -2475,7 +2479,7 @@
             <a:fld id="{DD835B76-D165-4C47-BDCE-CF989D3641B7}" type="datetimeFigureOut">
               <a:rPr lang="en-US" smtClean="0"/>
               <a:pPr/>
-              <a:t>3/8/2017</a:t>
+              <a:t>5/3/2017</a:t>
             </a:fld>
             <a:endParaRPr lang="en-US"/>
           </a:p>
@@ -2683,7 +2687,7 @@
             <a:fld id="{DD835B76-D165-4C47-BDCE-CF989D3641B7}" type="datetimeFigureOut">
               <a:rPr lang="en-US" smtClean="0"/>
               <a:pPr/>
-              <a:t>3/8/2017</a:t>
+              <a:t>5/3/2017</a:t>
             </a:fld>
             <a:endParaRPr lang="en-US"/>
           </a:p>
@@ -3619,14 +3623,15 @@
         <p:nvCxnSpPr>
           <p:cNvPr id="44" name="Straight Arrow Connector 43"/>
           <p:cNvCxnSpPr>
+            <a:cxnSpLocks/>
             <a:stCxn id="27" idx="2"/>
           </p:cNvCxnSpPr>
           <p:nvPr/>
         </p:nvCxnSpPr>
         <p:spPr>
           <a:xfrm flipH="1">
-            <a:off x="4533334" y="4800600"/>
-            <a:ext cx="267266" cy="457200"/>
+            <a:off x="4543600" y="4800600"/>
+            <a:ext cx="257000" cy="520225"/>
           </a:xfrm>
           <a:prstGeom prst="straightConnector1">
             <a:avLst/>
@@ -4148,8 +4153,8 @@
         </p:nvSpPr>
         <p:spPr>
           <a:xfrm>
-            <a:off x="1095616" y="5180112"/>
-            <a:ext cx="1329723" cy="307777"/>
+            <a:off x="1180707" y="5195038"/>
+            <a:ext cx="1045479" cy="307777"/>
           </a:xfrm>
           <a:prstGeom prst="rect">
             <a:avLst/>
@@ -4163,10 +4168,9 @@
           <a:lstStyle/>
           <a:p>
             <a:r>
-              <a:rPr lang="en-US" sz="1400" smtClean="0"/>
-              <a:t>Credit Card Info</a:t>
-            </a:r>
-            <a:endParaRPr lang="en-US" sz="1400" dirty="0"/>
+              <a:rPr lang="en-US" sz="1400" dirty="0"/>
+              <a:t>Credit Card </a:t>
+            </a:r>
           </a:p>
         </p:txBody>
       </p:sp>
@@ -4309,7 +4313,7 @@
           <a:lstStyle/>
           <a:p>
             <a:r>
-              <a:rPr lang="en-US" sz="900" smtClean="0"/>
+              <a:rPr lang="en-US" sz="900"/>
               <a:t>createdBy</a:t>
             </a:r>
             <a:endParaRPr lang="en-US" sz="900" dirty="0"/>
@@ -4426,7 +4430,7 @@
           <a:lstStyle/>
           <a:p>
             <a:r>
-              <a:rPr lang="en-US" sz="900" smtClean="0"/>
+              <a:rPr lang="en-US" sz="900"/>
               <a:t>paidWith</a:t>
             </a:r>
             <a:endParaRPr lang="en-US" sz="900" dirty="0"/>
@@ -4442,7 +4446,7 @@
         <p:spPr>
           <a:xfrm>
             <a:off x="8205959" y="2813182"/>
-            <a:ext cx="883333" cy="246221"/>
+            <a:ext cx="883333" cy="230832"/>
           </a:xfrm>
           <a:prstGeom prst="rect">
             <a:avLst/>
@@ -4456,9 +4460,10 @@
           <a:lstStyle/>
           <a:p>
             <a:r>
-              <a:rPr lang="en-US" sz="1000" u="sng" dirty="0"/>
-              <a:t>University ID</a:t>
-            </a:r>
+              <a:rPr lang="en-US" sz="900" u="sng" dirty="0" err="1"/>
+              <a:t>UniversityID</a:t>
+            </a:r>
+            <a:endParaRPr lang="en-US" sz="900" u="sng" dirty="0"/>
           </a:p>
         </p:txBody>
       </p:sp>
@@ -4508,8 +4513,8 @@
         </p:nvSpPr>
         <p:spPr>
           <a:xfrm>
-            <a:off x="1241824" y="2499318"/>
-            <a:ext cx="1077289" cy="261610"/>
+            <a:off x="1321404" y="2411528"/>
+            <a:ext cx="808396" cy="369332"/>
           </a:xfrm>
           <a:prstGeom prst="rect">
             <a:avLst/>
@@ -4523,10 +4528,9 @@
           <a:lstStyle/>
           <a:p>
             <a:r>
-              <a:rPr lang="en-US" sz="1100" u="sng" dirty="0" smtClean="0"/>
-              <a:t>Email Address</a:t>
-            </a:r>
-            <a:endParaRPr lang="en-US" sz="1100" u="sng" dirty="0"/>
+              <a:rPr lang="en-US" sz="900" u="sng" dirty="0"/>
+              <a:t>StudentEmailAddress</a:t>
+            </a:r>
           </a:p>
         </p:txBody>
       </p:sp>
@@ -4538,8 +4542,8 @@
         </p:nvSpPr>
         <p:spPr>
           <a:xfrm>
-            <a:off x="684214" y="3733800"/>
-            <a:ext cx="618580" cy="246221"/>
+            <a:off x="238921" y="3634383"/>
+            <a:ext cx="915986" cy="230832"/>
           </a:xfrm>
           <a:prstGeom prst="rect">
             <a:avLst/>
@@ -4553,8 +4557,8 @@
           <a:lstStyle/>
           <a:p>
             <a:r>
-              <a:rPr lang="en-US" sz="1000" dirty="0"/>
-              <a:t>Gender</a:t>
+              <a:rPr lang="en-US" sz="900" dirty="0"/>
+              <a:t>StudentGender</a:t>
             </a:r>
           </a:p>
         </p:txBody>
@@ -4567,8 +4571,8 @@
         </p:nvSpPr>
         <p:spPr>
           <a:xfrm>
-            <a:off x="1181100" y="3964718"/>
-            <a:ext cx="511425" cy="246221"/>
+            <a:off x="809432" y="3978660"/>
+            <a:ext cx="1054647" cy="230832"/>
           </a:xfrm>
           <a:prstGeom prst="rect">
             <a:avLst/>
@@ -4582,10 +4586,9 @@
           <a:lstStyle/>
           <a:p>
             <a:r>
-              <a:rPr lang="en-US" sz="1000"/>
-              <a:t>Name</a:t>
-            </a:r>
-            <a:endParaRPr lang="en-US" sz="1000" dirty="0"/>
+              <a:rPr lang="en-US" sz="900" dirty="0"/>
+              <a:t>StudentName</a:t>
+            </a:r>
           </a:p>
         </p:txBody>
       </p:sp>
@@ -4599,7 +4602,7 @@
         </p:nvCxnSpPr>
         <p:spPr>
           <a:xfrm>
-            <a:off x="1689372" y="2818178"/>
+            <a:off x="1723155" y="2799595"/>
             <a:ext cx="24335" cy="265214"/>
           </a:xfrm>
           <a:prstGeom prst="line">
@@ -4634,7 +4637,7 @@
         </p:nvCxnSpPr>
         <p:spPr>
           <a:xfrm flipV="1">
-            <a:off x="978820" y="3531281"/>
+            <a:off x="999666" y="3457564"/>
             <a:ext cx="515267" cy="216336"/>
           </a:xfrm>
           <a:prstGeom prst="line">
@@ -4665,14 +4668,14 @@
         <p:nvCxnSpPr>
           <p:cNvPr id="103" name="Straight Connector 102"/>
           <p:cNvCxnSpPr>
-            <a:stCxn id="178" idx="0"/>
+            <a:cxnSpLocks/>
           </p:cNvCxnSpPr>
           <p:nvPr/>
         </p:nvCxnSpPr>
         <p:spPr>
           <a:xfrm flipV="1">
-            <a:off x="1395164" y="3622208"/>
-            <a:ext cx="318543" cy="381852"/>
+            <a:off x="1301573" y="3610480"/>
+            <a:ext cx="216497" cy="341946"/>
           </a:xfrm>
           <a:prstGeom prst="line">
             <a:avLst/>
@@ -4707,7 +4710,7 @@
         <p:spPr>
           <a:xfrm>
             <a:off x="4177931" y="722927"/>
-            <a:ext cx="710807" cy="246221"/>
+            <a:ext cx="710807" cy="230832"/>
           </a:xfrm>
           <a:prstGeom prst="rect">
             <a:avLst/>
@@ -4721,9 +4724,10 @@
           <a:lstStyle/>
           <a:p>
             <a:r>
-              <a:rPr lang="en-US" sz="1000" u="sng" dirty="0"/>
-              <a:t>Course ID</a:t>
-            </a:r>
+              <a:rPr lang="en-US" sz="900" u="sng" dirty="0" err="1"/>
+              <a:t>CourseID</a:t>
+            </a:r>
+            <a:endParaRPr lang="en-US" sz="900" u="sng" dirty="0"/>
           </a:p>
         </p:txBody>
       </p:sp>
@@ -4773,8 +4777,8 @@
         </p:nvSpPr>
         <p:spPr>
           <a:xfrm>
-            <a:off x="7667827" y="5716896"/>
-            <a:ext cx="618580" cy="246221"/>
+            <a:off x="7567081" y="5713372"/>
+            <a:ext cx="1049167" cy="230832"/>
           </a:xfrm>
           <a:prstGeom prst="rect">
             <a:avLst/>
@@ -4788,8 +4792,8 @@
           <a:lstStyle/>
           <a:p>
             <a:r>
-              <a:rPr lang="en-US" sz="1000" dirty="0"/>
-              <a:t>Gender</a:t>
+              <a:rPr lang="en-US" sz="900" dirty="0"/>
+              <a:t>InstructorGender</a:t>
             </a:r>
           </a:p>
         </p:txBody>
@@ -4802,8 +4806,8 @@
         </p:nvSpPr>
         <p:spPr>
           <a:xfrm>
-            <a:off x="6256295" y="5364778"/>
-            <a:ext cx="511425" cy="246221"/>
+            <a:off x="6007757" y="5392762"/>
+            <a:ext cx="983064" cy="230832"/>
           </a:xfrm>
           <a:prstGeom prst="rect">
             <a:avLst/>
@@ -4817,8 +4821,8 @@
           <a:lstStyle/>
           <a:p>
             <a:r>
-              <a:rPr lang="en-US" sz="1000" dirty="0"/>
-              <a:t>Name</a:t>
+              <a:rPr lang="en-US" sz="900" dirty="0"/>
+              <a:t>InstructorName</a:t>
             </a:r>
           </a:p>
         </p:txBody>
@@ -4831,8 +4835,8 @@
         </p:nvSpPr>
         <p:spPr>
           <a:xfrm>
-            <a:off x="6685822" y="5720422"/>
-            <a:ext cx="953530" cy="246221"/>
+            <a:off x="6695425" y="5747082"/>
+            <a:ext cx="953530" cy="230832"/>
           </a:xfrm>
           <a:prstGeom prst="rect">
             <a:avLst/>
@@ -4846,7 +4850,7 @@
           <a:lstStyle/>
           <a:p>
             <a:r>
-              <a:rPr lang="en-US" sz="1000" u="sng" dirty="0"/>
+              <a:rPr lang="en-US" sz="900" u="sng" dirty="0"/>
               <a:t>Instructor ID</a:t>
             </a:r>
           </a:p>
@@ -4856,6 +4860,7 @@
         <p:nvCxnSpPr>
           <p:cNvPr id="157" name="Straight Connector 156"/>
           <p:cNvCxnSpPr>
+            <a:cxnSpLocks/>
             <a:stCxn id="187" idx="0"/>
             <a:endCxn id="143" idx="2"/>
           </p:cNvCxnSpPr>
@@ -4863,8 +4868,8 @@
         </p:nvCxnSpPr>
         <p:spPr>
           <a:xfrm flipV="1">
-            <a:off x="6494182" y="4889227"/>
-            <a:ext cx="45688" cy="494576"/>
+            <a:off x="6443265" y="4889227"/>
+            <a:ext cx="96605" cy="494576"/>
           </a:xfrm>
           <a:prstGeom prst="line">
             <a:avLst/>
@@ -4894,15 +4899,14 @@
         <p:nvCxnSpPr>
           <p:cNvPr id="168" name="Straight Connector 167"/>
           <p:cNvCxnSpPr>
-            <a:stCxn id="143" idx="2"/>
-            <a:endCxn id="191" idx="0"/>
+            <a:cxnSpLocks/>
           </p:cNvCxnSpPr>
           <p:nvPr/>
         </p:nvCxnSpPr>
         <p:spPr>
           <a:xfrm>
-            <a:off x="6539870" y="4889227"/>
-            <a:ext cx="1397451" cy="824145"/>
+            <a:off x="6549754" y="4884407"/>
+            <a:ext cx="1532522" cy="818702"/>
           </a:xfrm>
           <a:prstGeom prst="line">
             <a:avLst/>
@@ -4936,7 +4940,7 @@
         </p:nvSpPr>
         <p:spPr>
           <a:xfrm>
-            <a:off x="1207044" y="2394642"/>
+            <a:off x="1240827" y="2376059"/>
             <a:ext cx="964656" cy="423536"/>
           </a:xfrm>
           <a:prstGeom prst="ellipse">
@@ -4968,7 +4972,7 @@
           <a:lstStyle/>
           <a:p>
             <a:pPr algn="ctr"/>
-            <a:endParaRPr lang="en-US"/>
+            <a:endParaRPr lang="en-US" dirty="0"/>
           </a:p>
         </p:txBody>
       </p:sp>
@@ -4980,8 +4984,8 @@
         </p:nvSpPr>
         <p:spPr>
           <a:xfrm>
-            <a:off x="662411" y="3751960"/>
-            <a:ext cx="588623" cy="210439"/>
+            <a:off x="259975" y="3610667"/>
+            <a:ext cx="812554" cy="271212"/>
           </a:xfrm>
           <a:prstGeom prst="ellipse">
             <a:avLst/>
@@ -5024,8 +5028,8 @@
         </p:nvSpPr>
         <p:spPr>
           <a:xfrm>
-            <a:off x="1100852" y="4004060"/>
-            <a:ext cx="588623" cy="210439"/>
+            <a:off x="803405" y="3957516"/>
+            <a:ext cx="792717" cy="261352"/>
           </a:xfrm>
           <a:prstGeom prst="ellipse">
             <a:avLst/>
@@ -5156,8 +5160,8 @@
         </p:nvSpPr>
         <p:spPr>
           <a:xfrm>
-            <a:off x="6199870" y="5383803"/>
-            <a:ext cx="588623" cy="210439"/>
+            <a:off x="5995477" y="5383803"/>
+            <a:ext cx="895575" cy="274096"/>
           </a:xfrm>
           <a:prstGeom prst="ellipse">
             <a:avLst/>
@@ -5200,8 +5204,8 @@
         </p:nvSpPr>
         <p:spPr>
           <a:xfrm>
-            <a:off x="7613974" y="5713372"/>
-            <a:ext cx="646694" cy="253271"/>
+            <a:off x="7608514" y="5707929"/>
+            <a:ext cx="927756" cy="253271"/>
           </a:xfrm>
           <a:prstGeom prst="ellipse">
             <a:avLst/>
@@ -5717,7 +5721,7 @@
         <p:spPr>
           <a:xfrm>
             <a:off x="384463" y="128907"/>
-            <a:ext cx="808287" cy="246221"/>
+            <a:ext cx="808287" cy="230832"/>
           </a:xfrm>
           <a:prstGeom prst="rect">
             <a:avLst/>
@@ -5731,10 +5735,9 @@
           <a:lstStyle/>
           <a:p>
             <a:r>
-              <a:rPr lang="en-US" sz="1000" smtClean="0"/>
-              <a:t>rateStars</a:t>
-            </a:r>
-            <a:endParaRPr lang="en-US" sz="1000" dirty="0"/>
+              <a:rPr lang="en-US" sz="900" dirty="0"/>
+              <a:t>RateStars</a:t>
+            </a:r>
           </a:p>
         </p:txBody>
       </p:sp>
@@ -5747,7 +5750,7 @@
         <p:spPr>
           <a:xfrm>
             <a:off x="1733825" y="102488"/>
-            <a:ext cx="808287" cy="246221"/>
+            <a:ext cx="808287" cy="230832"/>
           </a:xfrm>
           <a:prstGeom prst="rect">
             <a:avLst/>
@@ -5761,10 +5764,9 @@
           <a:lstStyle/>
           <a:p>
             <a:r>
-              <a:rPr lang="en-US" sz="1000" dirty="0" smtClean="0"/>
-              <a:t>comments</a:t>
-            </a:r>
-            <a:endParaRPr lang="en-US" sz="1000" dirty="0"/>
+              <a:rPr lang="en-US" sz="900" dirty="0"/>
+              <a:t>Comments</a:t>
+            </a:r>
           </a:p>
         </p:txBody>
       </p:sp>
@@ -5938,8 +5940,8 @@
         </p:nvSpPr>
         <p:spPr>
           <a:xfrm>
-            <a:off x="104388" y="5457109"/>
-            <a:ext cx="609041" cy="261610"/>
+            <a:off x="168614" y="5443249"/>
+            <a:ext cx="609041" cy="230832"/>
           </a:xfrm>
           <a:prstGeom prst="rect">
             <a:avLst/>
@@ -5953,10 +5955,9 @@
           <a:lstStyle/>
           <a:p>
             <a:r>
-              <a:rPr lang="en-US" sz="1100" dirty="0" smtClean="0"/>
+              <a:rPr lang="en-US" sz="900" dirty="0"/>
               <a:t>cvv</a:t>
             </a:r>
-            <a:endParaRPr lang="en-US" sz="1100" dirty="0"/>
           </a:p>
         </p:txBody>
       </p:sp>
@@ -5968,8 +5969,8 @@
         </p:nvSpPr>
         <p:spPr>
           <a:xfrm>
-            <a:off x="1259413" y="6168342"/>
-            <a:ext cx="609041" cy="261610"/>
+            <a:off x="1194386" y="6185220"/>
+            <a:ext cx="988573" cy="230832"/>
           </a:xfrm>
           <a:prstGeom prst="rect">
             <a:avLst/>
@@ -5983,10 +5984,9 @@
           <a:lstStyle/>
           <a:p>
             <a:r>
-              <a:rPr lang="en-US" sz="1100" u="sng" dirty="0" smtClean="0"/>
-              <a:t>cardNo</a:t>
-            </a:r>
-            <a:endParaRPr lang="en-US" sz="1100" u="sng" dirty="0"/>
+              <a:rPr lang="en-US" sz="900" u="sng" dirty="0"/>
+              <a:t>CreditCardNo</a:t>
+            </a:r>
           </a:p>
         </p:txBody>
       </p:sp>
@@ -5998,8 +5998,8 @@
         </p:nvSpPr>
         <p:spPr>
           <a:xfrm>
-            <a:off x="2074836" y="6003124"/>
-            <a:ext cx="755870" cy="261610"/>
+            <a:off x="2145455" y="6014145"/>
+            <a:ext cx="755870" cy="230832"/>
           </a:xfrm>
           <a:prstGeom prst="rect">
             <a:avLst/>
@@ -6013,10 +6013,9 @@
           <a:lstStyle/>
           <a:p>
             <a:r>
-              <a:rPr lang="en-US" sz="1100" dirty="0" smtClean="0"/>
-              <a:t>expDate</a:t>
-            </a:r>
-            <a:endParaRPr lang="en-US" sz="1100" dirty="0"/>
+              <a:rPr lang="en-US" sz="900" dirty="0"/>
+              <a:t>ExpDate</a:t>
+            </a:r>
           </a:p>
         </p:txBody>
       </p:sp>
@@ -6028,8 +6027,8 @@
         </p:nvSpPr>
         <p:spPr>
           <a:xfrm>
-            <a:off x="117321" y="6044193"/>
-            <a:ext cx="985442" cy="261610"/>
+            <a:off x="169850" y="6062935"/>
+            <a:ext cx="985442" cy="230832"/>
           </a:xfrm>
           <a:prstGeom prst="rect">
             <a:avLst/>
@@ -6043,10 +6042,9 @@
           <a:lstStyle/>
           <a:p>
             <a:r>
-              <a:rPr lang="en-US" sz="1100" smtClean="0"/>
-              <a:t>nameOnCard</a:t>
-            </a:r>
-            <a:endParaRPr lang="en-US" sz="1100" dirty="0"/>
+              <a:rPr lang="en-US" sz="900" dirty="0"/>
+              <a:t>NameOnCard</a:t>
+            </a:r>
           </a:p>
         </p:txBody>
       </p:sp>
@@ -6058,7 +6056,7 @@
         </p:nvSpPr>
         <p:spPr>
           <a:xfrm>
-            <a:off x="1107470" y="6208186"/>
+            <a:off x="1104493" y="6193069"/>
             <a:ext cx="967603" cy="239999"/>
           </a:xfrm>
           <a:prstGeom prst="ellipse">
@@ -6103,7 +6101,7 @@
         <p:spPr>
           <a:xfrm>
             <a:off x="56624" y="5443250"/>
-            <a:ext cx="503573" cy="262530"/>
+            <a:ext cx="574685" cy="262530"/>
           </a:xfrm>
           <a:prstGeom prst="ellipse">
             <a:avLst/>
@@ -6186,13 +6184,13 @@
         <p:nvCxnSpPr>
           <p:cNvPr id="169" name="Straight Connector 168"/>
           <p:cNvCxnSpPr>
-            <a:endCxn id="81" idx="1"/>
+            <a:cxnSpLocks/>
           </p:cNvCxnSpPr>
           <p:nvPr/>
         </p:nvCxnSpPr>
         <p:spPr>
           <a:xfrm flipV="1">
-            <a:off x="524094" y="5334001"/>
+            <a:off x="497808" y="5266846"/>
             <a:ext cx="571522" cy="191578"/>
           </a:xfrm>
           <a:prstGeom prst="line">
@@ -6338,8 +6336,8 @@
         </p:nvSpPr>
         <p:spPr>
           <a:xfrm>
-            <a:off x="3068782" y="6405941"/>
-            <a:ext cx="990600" cy="261610"/>
+            <a:off x="3124200" y="6410684"/>
+            <a:ext cx="990600" cy="230832"/>
           </a:xfrm>
           <a:prstGeom prst="rect">
             <a:avLst/>
@@ -6353,10 +6351,9 @@
           <a:lstStyle/>
           <a:p>
             <a:r>
-              <a:rPr lang="en-US" sz="1100" u="sng" dirty="0" smtClean="0"/>
-              <a:t>transactionID</a:t>
-            </a:r>
-            <a:endParaRPr lang="en-US" sz="1100" u="sng" dirty="0"/>
+              <a:rPr lang="en-US" sz="900" u="sng" dirty="0"/>
+              <a:t>TransactionID</a:t>
+            </a:r>
           </a:p>
         </p:txBody>
       </p:sp>
@@ -6369,7 +6366,7 @@
         <p:spPr>
           <a:xfrm>
             <a:off x="4349530" y="6369339"/>
-            <a:ext cx="1239628" cy="261610"/>
+            <a:ext cx="1239628" cy="230832"/>
           </a:xfrm>
           <a:prstGeom prst="rect">
             <a:avLst/>
@@ -6383,10 +6380,9 @@
           <a:lstStyle/>
           <a:p>
             <a:r>
-              <a:rPr lang="en-US" sz="1100" smtClean="0"/>
-              <a:t>transactionStatus</a:t>
-            </a:r>
-            <a:endParaRPr lang="en-US" sz="1100" dirty="0"/>
+              <a:rPr lang="en-US" sz="900" dirty="0"/>
+              <a:t>TransactionStatus</a:t>
+            </a:r>
           </a:p>
         </p:txBody>
       </p:sp>
@@ -6398,7 +6394,7 @@
         </p:nvSpPr>
         <p:spPr>
           <a:xfrm>
-            <a:off x="3068782" y="6426382"/>
+            <a:off x="3074837" y="6414638"/>
             <a:ext cx="967603" cy="239999"/>
           </a:xfrm>
           <a:prstGeom prst="ellipse">
@@ -6560,8 +6556,8 @@
         </p:nvSpPr>
         <p:spPr>
           <a:xfrm>
-            <a:off x="5181600" y="5978522"/>
-            <a:ext cx="990600" cy="261610"/>
+            <a:off x="5082185" y="5947720"/>
+            <a:ext cx="1499283" cy="230832"/>
           </a:xfrm>
           <a:prstGeom prst="rect">
             <a:avLst/>
@@ -6575,10 +6571,9 @@
           <a:lstStyle/>
           <a:p>
             <a:r>
-              <a:rPr lang="en-US" sz="1100" dirty="0" smtClean="0"/>
-              <a:t>timeStamp</a:t>
-            </a:r>
-            <a:endParaRPr lang="en-US" sz="1100" dirty="0"/>
+              <a:rPr lang="en-US" sz="900" dirty="0"/>
+              <a:t>TransactionTimeStamp</a:t>
+            </a:r>
           </a:p>
         </p:txBody>
       </p:sp>
@@ -6590,8 +6585,8 @@
         </p:nvSpPr>
         <p:spPr>
           <a:xfrm>
-            <a:off x="5101632" y="5968987"/>
-            <a:ext cx="967603" cy="239999"/>
+            <a:off x="5101632" y="5863326"/>
+            <a:ext cx="1216457" cy="372365"/>
           </a:xfrm>
           <a:prstGeom prst="ellipse">
             <a:avLst/>
@@ -6630,6 +6625,7 @@
         <p:nvCxnSpPr>
           <p:cNvPr id="203" name="Straight Connector 202"/>
           <p:cNvCxnSpPr>
+            <a:cxnSpLocks/>
             <a:stCxn id="129" idx="2"/>
             <a:endCxn id="202" idx="2"/>
           </p:cNvCxnSpPr>
@@ -6638,7 +6634,7 @@
         <p:spPr>
           <a:xfrm>
             <a:off x="4253159" y="5885990"/>
-            <a:ext cx="848473" cy="202997"/>
+            <a:ext cx="848473" cy="163519"/>
           </a:xfrm>
           <a:prstGeom prst="line">
             <a:avLst/>
@@ -6672,8 +6668,8 @@
         </p:nvSpPr>
         <p:spPr>
           <a:xfrm>
-            <a:off x="4894411" y="366671"/>
-            <a:ext cx="710807" cy="246221"/>
+            <a:off x="4730463" y="371407"/>
+            <a:ext cx="1031126" cy="230832"/>
           </a:xfrm>
           <a:prstGeom prst="rect">
             <a:avLst/>
@@ -6687,8 +6683,8 @@
           <a:lstStyle/>
           <a:p>
             <a:r>
-              <a:rPr lang="en-US" sz="1000" dirty="0"/>
-              <a:t>Overview</a:t>
+              <a:rPr lang="en-US" sz="900" dirty="0"/>
+              <a:t>CourseOverview</a:t>
             </a:r>
           </a:p>
         </p:txBody>
@@ -6701,8 +6697,8 @@
         </p:nvSpPr>
         <p:spPr>
           <a:xfrm>
-            <a:off x="5885907" y="294030"/>
-            <a:ext cx="688009" cy="261610"/>
+            <a:off x="5782755" y="295087"/>
+            <a:ext cx="923651" cy="230832"/>
           </a:xfrm>
           <a:prstGeom prst="rect">
             <a:avLst/>
@@ -6715,8 +6711,8 @@
           <a:lstStyle/>
           <a:p>
             <a:r>
-              <a:rPr lang="en-US" sz="1100" dirty="0"/>
-              <a:t>Duration</a:t>
+              <a:rPr lang="en-US" sz="900" dirty="0"/>
+              <a:t>CourseDuration</a:t>
             </a:r>
           </a:p>
         </p:txBody>
@@ -6729,8 +6725,8 @@
         </p:nvSpPr>
         <p:spPr>
           <a:xfrm>
-            <a:off x="6457428" y="598251"/>
-            <a:ext cx="668773" cy="246221"/>
+            <a:off x="6318089" y="613737"/>
+            <a:ext cx="992579" cy="230832"/>
           </a:xfrm>
           <a:prstGeom prst="rect">
             <a:avLst/>
@@ -6743,15 +6739,15 @@
           <a:lstStyle/>
           <a:p>
             <a:r>
-              <a:rPr lang="en-US" sz="1000" dirty="0">
+              <a:rPr lang="en-US" sz="900" dirty="0">
                 <a:solidFill>
                   <a:srgbClr val="454545"/>
                 </a:solidFill>
                 <a:latin typeface="Helvetica" charset="0"/>
               </a:rPr>
-              <a:t>Difficulty</a:t>
-            </a:r>
-            <a:endParaRPr lang="en-US" sz="1000" dirty="0">
+              <a:t>CourseDifficulty</a:t>
+            </a:r>
+            <a:endParaRPr lang="en-US" sz="900" dirty="0">
               <a:solidFill>
                 <a:srgbClr val="454545"/>
               </a:solidFill>
@@ -7064,8 +7060,8 @@
         </p:nvCxnSpPr>
         <p:spPr>
           <a:xfrm flipV="1">
-            <a:off x="5336051" y="844472"/>
-            <a:ext cx="1455764" cy="877991"/>
+            <a:off x="5336051" y="844569"/>
+            <a:ext cx="1478328" cy="877894"/>
           </a:xfrm>
           <a:prstGeom prst="line">
             <a:avLst/>
@@ -7145,8 +7141,8 @@
         </p:nvSpPr>
         <p:spPr>
           <a:xfrm>
-            <a:off x="6494182" y="1071681"/>
-            <a:ext cx="702436" cy="246221"/>
+            <a:off x="6286029" y="1088238"/>
+            <a:ext cx="1024639" cy="230832"/>
           </a:xfrm>
           <a:prstGeom prst="rect">
             <a:avLst/>
@@ -7159,15 +7155,15 @@
           <a:lstStyle/>
           <a:p>
             <a:r>
-              <a:rPr lang="en-US" sz="1000" dirty="0" smtClean="0">
+              <a:rPr lang="en-US" sz="900" dirty="0">
                 <a:solidFill>
                   <a:srgbClr val="454545"/>
                 </a:solidFill>
                 <a:latin typeface="Helvetica" charset="0"/>
               </a:rPr>
-              <a:t>Category</a:t>
-            </a:r>
-            <a:endParaRPr lang="en-US" sz="1000" dirty="0">
+              <a:t>CourseCategory</a:t>
+            </a:r>
+            <a:endParaRPr lang="en-US" sz="900" dirty="0">
               <a:solidFill>
                 <a:srgbClr val="454545"/>
               </a:solidFill>
@@ -7267,8 +7263,8 @@
         </p:nvSpPr>
         <p:spPr>
           <a:xfrm>
-            <a:off x="4196535" y="1152677"/>
-            <a:ext cx="710807" cy="246221"/>
+            <a:off x="4029342" y="1191024"/>
+            <a:ext cx="908865" cy="230832"/>
           </a:xfrm>
           <a:prstGeom prst="rect">
             <a:avLst/>
@@ -7282,10 +7278,9 @@
           <a:lstStyle/>
           <a:p>
             <a:r>
-              <a:rPr lang="en-US" sz="1000" dirty="0" smtClean="0"/>
-              <a:t>Name</a:t>
-            </a:r>
-            <a:endParaRPr lang="en-US" sz="1000" dirty="0"/>
+              <a:rPr lang="en-US" sz="900" dirty="0"/>
+              <a:t>CourseName</a:t>
+            </a:r>
           </a:p>
         </p:txBody>
       </p:sp>
@@ -7379,8 +7374,8 @@
         </p:nvSpPr>
         <p:spPr>
           <a:xfrm>
-            <a:off x="7436453" y="935785"/>
-            <a:ext cx="447558" cy="246221"/>
+            <a:off x="7280226" y="980269"/>
+            <a:ext cx="793807" cy="230832"/>
           </a:xfrm>
           <a:prstGeom prst="rect">
             <a:avLst/>
@@ -7393,15 +7388,15 @@
           <a:lstStyle/>
           <a:p>
             <a:r>
-              <a:rPr lang="en-US" sz="1000" dirty="0" smtClean="0">
+              <a:rPr lang="en-US" sz="900" dirty="0">
                 <a:solidFill>
                   <a:srgbClr val="454545"/>
                 </a:solidFill>
                 <a:latin typeface="Helvetica" charset="0"/>
               </a:rPr>
-              <a:t>FAQ</a:t>
-            </a:r>
-            <a:endParaRPr lang="en-US" sz="1000" dirty="0">
+              <a:t>CourseFAQ</a:t>
+            </a:r>
+            <a:endParaRPr lang="en-US" sz="900" dirty="0">
               <a:solidFill>
                 <a:srgbClr val="454545"/>
               </a:solidFill>
@@ -7501,7 +7496,7 @@
         <p:spPr>
           <a:xfrm>
             <a:off x="2320277" y="2297811"/>
-            <a:ext cx="765823" cy="261610"/>
+            <a:ext cx="956323" cy="230832"/>
           </a:xfrm>
           <a:prstGeom prst="rect">
             <a:avLst/>
@@ -7515,10 +7510,9 @@
           <a:lstStyle/>
           <a:p>
             <a:r>
-              <a:rPr lang="en-US" sz="1100" smtClean="0"/>
-              <a:t>birthDate</a:t>
-            </a:r>
-            <a:endParaRPr lang="en-US" sz="1100" dirty="0"/>
+              <a:rPr lang="en-US" sz="900" dirty="0"/>
+              <a:t>StudentDOB</a:t>
+            </a:r>
           </a:p>
         </p:txBody>
       </p:sp>
@@ -7612,8 +7606,8 @@
         </p:nvSpPr>
         <p:spPr>
           <a:xfrm>
-            <a:off x="2723266" y="2663580"/>
-            <a:ext cx="929721" cy="230832"/>
+            <a:off x="2591018" y="2640202"/>
+            <a:ext cx="1078594" cy="230832"/>
           </a:xfrm>
           <a:prstGeom prst="rect">
             <a:avLst/>
@@ -7627,8 +7621,8 @@
           <a:lstStyle/>
           <a:p>
             <a:r>
-              <a:rPr lang="en-US" sz="900" dirty="0" smtClean="0"/>
-              <a:t>Location</a:t>
+              <a:rPr lang="en-US" sz="900" dirty="0"/>
+              <a:t>StudentLocation</a:t>
             </a:r>
             <a:endParaRPr lang="en-US" sz="900" u="sng" dirty="0"/>
           </a:p>
@@ -7724,8 +7718,8 @@
         </p:nvSpPr>
         <p:spPr>
           <a:xfrm>
-            <a:off x="8011753" y="3343615"/>
-            <a:ext cx="526106" cy="246221"/>
+            <a:off x="7866060" y="3382321"/>
+            <a:ext cx="998991" cy="230832"/>
           </a:xfrm>
           <a:prstGeom prst="rect">
             <a:avLst/>
@@ -7738,15 +7732,15 @@
           <a:lstStyle/>
           <a:p>
             <a:r>
-              <a:rPr lang="en-US" sz="1000" dirty="0" smtClean="0">
+              <a:rPr lang="en-US" sz="900" dirty="0">
                 <a:solidFill>
                   <a:srgbClr val="454545"/>
                 </a:solidFill>
                 <a:latin typeface="Helvetica" charset="0"/>
               </a:rPr>
-              <a:t>Name</a:t>
-            </a:r>
-            <a:endParaRPr lang="en-US" sz="1000" dirty="0">
+              <a:t>UniversityName</a:t>
+            </a:r>
+            <a:endParaRPr lang="en-US" sz="900" dirty="0">
               <a:solidFill>
                 <a:srgbClr val="454545"/>
               </a:solidFill>
@@ -7764,8 +7758,8 @@
         </p:nvSpPr>
         <p:spPr>
           <a:xfrm>
-            <a:off x="7911771" y="3281668"/>
-            <a:ext cx="697792" cy="418067"/>
+            <a:off x="7911770" y="3281668"/>
+            <a:ext cx="907573" cy="418067"/>
           </a:xfrm>
           <a:prstGeom prst="ellipse">
             <a:avLst/>
@@ -7804,6 +7798,7 @@
         <p:nvCxnSpPr>
           <p:cNvPr id="272" name="Straight Connector 271"/>
           <p:cNvCxnSpPr>
+            <a:cxnSpLocks/>
             <a:stCxn id="271" idx="0"/>
             <a:endCxn id="136" idx="2"/>
           </p:cNvCxnSpPr>
@@ -7812,7 +7807,7 @@
         <p:spPr>
           <a:xfrm flipH="1" flipV="1">
             <a:off x="7758359" y="2609390"/>
-            <a:ext cx="502308" cy="672278"/>
+            <a:ext cx="607198" cy="672278"/>
           </a:xfrm>
           <a:prstGeom prst="line">
             <a:avLst/>
@@ -7846,8 +7841,8 @@
         </p:nvSpPr>
         <p:spPr>
           <a:xfrm>
-            <a:off x="7172190" y="3067267"/>
-            <a:ext cx="824265" cy="246221"/>
+            <a:off x="6901938" y="3088720"/>
+            <a:ext cx="1268296" cy="230832"/>
           </a:xfrm>
           <a:prstGeom prst="rect">
             <a:avLst/>
@@ -7860,15 +7855,15 @@
           <a:lstStyle/>
           <a:p>
             <a:r>
-              <a:rPr lang="en-US" sz="1000" smtClean="0">
+              <a:rPr lang="en-US" sz="900" dirty="0">
                 <a:solidFill>
                   <a:srgbClr val="454545"/>
                 </a:solidFill>
                 <a:latin typeface="Helvetica" charset="0"/>
               </a:rPr>
-              <a:t>Description</a:t>
-            </a:r>
-            <a:endParaRPr lang="en-US" sz="1000" dirty="0">
+              <a:t>UniversityDescription</a:t>
+            </a:r>
+            <a:endParaRPr lang="en-US" sz="900" dirty="0">
               <a:solidFill>
                 <a:srgbClr val="454545"/>
               </a:solidFill>
@@ -7886,8 +7881,8 @@
         </p:nvSpPr>
         <p:spPr>
           <a:xfrm>
-            <a:off x="7154718" y="3043040"/>
-            <a:ext cx="825928" cy="325377"/>
+            <a:off x="6952583" y="3043040"/>
+            <a:ext cx="1172844" cy="325377"/>
           </a:xfrm>
           <a:prstGeom prst="ellipse">
             <a:avLst/>
@@ -7926,6 +7921,7 @@
         <p:nvCxnSpPr>
           <p:cNvPr id="277" name="Straight Connector 276"/>
           <p:cNvCxnSpPr>
+            <a:cxnSpLocks/>
             <a:stCxn id="136" idx="2"/>
             <a:endCxn id="276" idx="0"/>
           </p:cNvCxnSpPr>
@@ -7933,8 +7929,8 @@
         </p:nvCxnSpPr>
         <p:spPr>
           <a:xfrm flipH="1">
-            <a:off x="7567682" y="2609390"/>
-            <a:ext cx="190677" cy="433650"/>
+            <a:off x="7539005" y="2609390"/>
+            <a:ext cx="219354" cy="433650"/>
           </a:xfrm>
           <a:prstGeom prst="line">
             <a:avLst/>
@@ -7964,15 +7960,14 @@
         <p:nvCxnSpPr>
           <p:cNvPr id="283" name="Straight Connector 282"/>
           <p:cNvCxnSpPr>
-            <a:stCxn id="143" idx="2"/>
-            <a:endCxn id="151" idx="0"/>
+            <a:cxnSpLocks/>
           </p:cNvCxnSpPr>
           <p:nvPr/>
         </p:nvCxnSpPr>
         <p:spPr>
           <a:xfrm>
-            <a:off x="6539870" y="4889227"/>
-            <a:ext cx="622717" cy="831195"/>
+            <a:off x="6563182" y="4873617"/>
+            <a:ext cx="632320" cy="857855"/>
           </a:xfrm>
           <a:prstGeom prst="line">
             <a:avLst/>
@@ -8006,8 +8001,8 @@
         </p:nvSpPr>
         <p:spPr>
           <a:xfrm>
-            <a:off x="8127269" y="5327387"/>
-            <a:ext cx="922952" cy="246221"/>
+            <a:off x="7847261" y="5322528"/>
+            <a:ext cx="1348180" cy="230832"/>
           </a:xfrm>
           <a:prstGeom prst="rect">
             <a:avLst/>
@@ -8021,10 +8016,9 @@
           <a:lstStyle/>
           <a:p>
             <a:r>
-              <a:rPr lang="en-US" sz="1000" smtClean="0"/>
-              <a:t>Specialization </a:t>
-            </a:r>
-            <a:endParaRPr lang="en-US" sz="1000" dirty="0"/>
+              <a:rPr lang="en-US" sz="900" dirty="0"/>
+              <a:t>InstructorSpecialization </a:t>
+            </a:r>
           </a:p>
         </p:txBody>
       </p:sp>
@@ -8036,8 +8030,8 @@
         </p:nvSpPr>
         <p:spPr>
           <a:xfrm>
-            <a:off x="8118441" y="5299678"/>
-            <a:ext cx="954105" cy="294564"/>
+            <a:off x="7847261" y="5299678"/>
+            <a:ext cx="1225285" cy="294564"/>
           </a:xfrm>
           <a:prstGeom prst="ellipse">
             <a:avLst/>
@@ -8076,6 +8070,7 @@
         <p:nvCxnSpPr>
           <p:cNvPr id="301" name="Straight Connector 300"/>
           <p:cNvCxnSpPr>
+            <a:cxnSpLocks/>
             <a:stCxn id="300" idx="0"/>
             <a:endCxn id="143" idx="2"/>
           </p:cNvCxnSpPr>
@@ -8084,7 +8079,7 @@
         <p:spPr>
           <a:xfrm flipH="1" flipV="1">
             <a:off x="6539870" y="4889227"/>
-            <a:ext cx="2055624" cy="410451"/>
+            <a:ext cx="1920034" cy="410451"/>
           </a:xfrm>
           <a:prstGeom prst="line">
             <a:avLst/>

</xml_diff>